<commit_message>
Modified ModelComponentClassDiagram.pptx and changed ModelClassDiagram.png
</commit_message>
<xml_diff>
--- a/docs/diagrams/ModelComponentClassDiagram.pptx
+++ b/docs/diagrams/ModelComponentClassDiagram.pptx
@@ -4107,12 +4107,12 @@
           <a:p>
             <a:pPr algn="ctr"/>
             <a:r>
-              <a:rPr lang="en-US" sz="1050" dirty="0" smtClean="0">
+              <a:rPr lang="en-US" sz="1050" dirty="0" err="1" smtClean="0">
                 <a:solidFill>
                   <a:srgbClr val="7030A0"/>
                 </a:solidFill>
               </a:rPr>
-              <a:t>Typed</a:t>
+              <a:t>TaskManager</a:t>
             </a:r>
             <a:endParaRPr lang="en-SG" sz="1050" dirty="0">
               <a:solidFill>
@@ -5185,7 +5185,7 @@
           <a:p>
             <a:pPr algn="ctr"/>
             <a:r>
-              <a:rPr lang="en-US" sz="1050" smtClean="0">
+              <a:rPr lang="en-US" sz="1050" dirty="0" err="1" smtClean="0">
                 <a:solidFill>
                   <a:srgbClr val="7030A0"/>
                 </a:solidFill>

</xml_diff>